<commit_message>
Tweaks to 2022-09-14 Opening slides
cleaned up schedule slide (fonts, names, times) and used official session names for breakouts
</commit_message>
<xml_diff>
--- a/PRESENTATIONS/2022-09-hybrid-f2f/2022-09-14-WoT-F2F-Opening-Sebastian.pptx
+++ b/PRESENTATIONS/2022-09-hybrid-f2f/2022-09-14-WoT-F2F-Opening-Sebastian.pptx
@@ -372,7 +372,7 @@
           <a:p>
             <a:fld id="{C8816669-4A9E-2244-B321-FE3C257B743B}" type="slidenum">
               <a:rPr lang="en-US" smtClean="0"/>
-              <a:t>‹Nr.›</a:t>
+              <a:t>‹#›</a:t>
             </a:fld>
             <a:endParaRPr lang="en-US"/>
           </a:p>
@@ -903,7 +903,7 @@
           <a:p>
             <a:fld id="{055BDE2E-7167-1944-9FEE-E44668D91CB6}" type="slidenum">
               <a:rPr lang="en-US" smtClean="0"/>
-              <a:t>‹Nr.›</a:t>
+              <a:t>‹#›</a:t>
             </a:fld>
             <a:endParaRPr lang="en-US"/>
           </a:p>
@@ -1171,7 +1171,7 @@
           <a:p>
             <a:fld id="{055BDE2E-7167-1944-9FEE-E44668D91CB6}" type="slidenum">
               <a:rPr lang="en-US" smtClean="0"/>
-              <a:t>‹Nr.›</a:t>
+              <a:t>‹#›</a:t>
             </a:fld>
             <a:endParaRPr lang="en-US"/>
           </a:p>
@@ -1397,7 +1397,7 @@
           <a:p>
             <a:fld id="{055BDE2E-7167-1944-9FEE-E44668D91CB6}" type="slidenum">
               <a:rPr lang="en-US" smtClean="0"/>
-              <a:t>‹Nr.›</a:t>
+              <a:t>‹#›</a:t>
             </a:fld>
             <a:endParaRPr lang="en-US"/>
           </a:p>
@@ -1769,7 +1769,7 @@
           <a:p>
             <a:fld id="{055BDE2E-7167-1944-9FEE-E44668D91CB6}" type="slidenum">
               <a:rPr lang="en-US" smtClean="0"/>
-              <a:t>‹Nr.›</a:t>
+              <a:t>‹#›</a:t>
             </a:fld>
             <a:endParaRPr lang="en-US"/>
           </a:p>
@@ -2099,7 +2099,7 @@
           <a:p>
             <a:fld id="{055BDE2E-7167-1944-9FEE-E44668D91CB6}" type="slidenum">
               <a:rPr lang="en-US" smtClean="0"/>
-              <a:t>‹Nr.›</a:t>
+              <a:t>‹#›</a:t>
             </a:fld>
             <a:endParaRPr lang="en-US"/>
           </a:p>
@@ -2572,7 +2572,7 @@
           <a:p>
             <a:fld id="{055BDE2E-7167-1944-9FEE-E44668D91CB6}" type="slidenum">
               <a:rPr lang="en-US" smtClean="0"/>
-              <a:t>‹Nr.›</a:t>
+              <a:t>‹#›</a:t>
             </a:fld>
             <a:endParaRPr lang="en-US"/>
           </a:p>
@@ -2778,7 +2778,7 @@
           <a:p>
             <a:fld id="{055BDE2E-7167-1944-9FEE-E44668D91CB6}" type="slidenum">
               <a:rPr lang="en-US" smtClean="0"/>
-              <a:t>‹Nr.›</a:t>
+              <a:t>‹#›</a:t>
             </a:fld>
             <a:endParaRPr lang="en-US"/>
           </a:p>
@@ -2948,7 +2948,7 @@
           <a:p>
             <a:fld id="{055BDE2E-7167-1944-9FEE-E44668D91CB6}" type="slidenum">
               <a:rPr lang="en-US" smtClean="0"/>
-              <a:t>‹Nr.›</a:t>
+              <a:t>‹#›</a:t>
             </a:fld>
             <a:endParaRPr lang="en-US"/>
           </a:p>
@@ -3320,7 +3320,7 @@
           <a:p>
             <a:fld id="{055BDE2E-7167-1944-9FEE-E44668D91CB6}" type="slidenum">
               <a:rPr lang="en-US" smtClean="0"/>
-              <a:t>‹Nr.›</a:t>
+              <a:t>‹#›</a:t>
             </a:fld>
             <a:endParaRPr lang="en-US"/>
           </a:p>
@@ -3672,7 +3672,7 @@
           <a:p>
             <a:fld id="{055BDE2E-7167-1944-9FEE-E44668D91CB6}" type="slidenum">
               <a:rPr lang="en-US" smtClean="0"/>
-              <a:t>‹Nr.›</a:t>
+              <a:t>‹#›</a:t>
             </a:fld>
             <a:endParaRPr lang="en-US"/>
           </a:p>
@@ -3988,7 +3988,7 @@
             <a:fld id="{055BDE2E-7167-1944-9FEE-E44668D91CB6}" type="slidenum">
               <a:rPr lang="en-US" smtClean="0"/>
               <a:pPr/>
-              <a:t>‹Nr.›</a:t>
+              <a:t>‹#›</a:t>
             </a:fld>
             <a:endParaRPr lang="en-US" dirty="0"/>
           </a:p>
@@ -6114,7 +6114,7 @@
                 <a:effectLst/>
                 <a:latin typeface="Arial" panose="020B0604020202020204" pitchFamily="34" charset="0"/>
               </a:rPr>
-              <a:t>Opening</a:t>
+              <a:t>Opening </a:t>
             </a:r>
             <a:r>
               <a:rPr lang="en-CA" b="0" i="0" dirty="0">
@@ -6124,7 +6124,7 @@
                 <a:effectLst/>
                 <a:latin typeface="Arial" panose="020B0604020202020204" pitchFamily="34" charset="0"/>
               </a:rPr>
-              <a:t> (10m) – Sebastian</a:t>
+              <a:t>– Sebastian</a:t>
             </a:r>
           </a:p>
           <a:p>
@@ -6149,7 +6149,7 @@
                 </a:solidFill>
                 <a:latin typeface="Arial" panose="020B0604020202020204" pitchFamily="34" charset="0"/>
               </a:rPr>
-              <a:t>Short WoT intro and latest about WoT WG/IG </a:t>
+              <a:t>WoT Introduction and Status </a:t>
             </a:r>
             <a:r>
               <a:rPr lang="en-CA" b="0" i="0" dirty="0">
@@ -6159,7 +6159,7 @@
                 <a:effectLst/>
                 <a:latin typeface="Arial" panose="020B0604020202020204" pitchFamily="34" charset="0"/>
               </a:rPr>
-              <a:t>- McCool </a:t>
+              <a:t>– McCool </a:t>
             </a:r>
           </a:p>
           <a:p>
@@ -6174,15 +6174,6 @@
               <a:t>8:45-9:05: </a:t>
             </a:r>
             <a:r>
-              <a:rPr lang="en-CA" b="1" dirty="0">
-                <a:solidFill>
-                  <a:srgbClr val="252525"/>
-                </a:solidFill>
-                <a:latin typeface="Arial" panose="020B0604020202020204" pitchFamily="34" charset="0"/>
-              </a:rPr>
-              <a:t>Latest about </a:t>
-            </a:r>
-            <a:r>
               <a:rPr lang="en-CA" b="1" i="0" dirty="0">
                 <a:solidFill>
                   <a:srgbClr val="252525"/>
@@ -6190,7 +6181,7 @@
                 <a:effectLst/>
                 <a:latin typeface="Arial" panose="020B0604020202020204" pitchFamily="34" charset="0"/>
               </a:rPr>
-              <a:t>WoT CG (15m) </a:t>
+              <a:t>WoT CG </a:t>
             </a:r>
             <a:r>
               <a:rPr lang="en-CA" b="0" i="0" dirty="0">
@@ -6200,7 +6191,7 @@
                 <a:effectLst/>
                 <a:latin typeface="Arial" panose="020B0604020202020204" pitchFamily="34" charset="0"/>
               </a:rPr>
-              <a:t>-</a:t>
+              <a:t>–</a:t>
             </a:r>
             <a:r>
               <a:rPr lang="en-CA" dirty="0">
@@ -6239,15 +6230,6 @@
                 <a:latin typeface="Arial" panose="020B0604020202020204" pitchFamily="34" charset="0"/>
               </a:rPr>
               <a:t>9:05-9:25: </a:t>
-            </a:r>
-            <a:r>
-              <a:rPr lang="en-CA" b="1" dirty="0">
-                <a:solidFill>
-                  <a:srgbClr val="252525"/>
-                </a:solidFill>
-                <a:latin typeface="Arial" panose="020B0604020202020204" pitchFamily="34" charset="0"/>
-              </a:rPr>
-              <a:t>Latest about </a:t>
             </a:r>
             <a:r>
               <a:rPr lang="de-DE" b="1" dirty="0">
@@ -6284,7 +6266,7 @@
                 <a:effectLst/>
                 <a:latin typeface="Arial" panose="020B0604020202020204" pitchFamily="34" charset="0"/>
               </a:rPr>
-              <a:t>- </a:t>
+              <a:t>– </a:t>
             </a:r>
             <a:r>
               <a:rPr lang="en-CA" b="0" i="0" dirty="0" err="1">
@@ -6296,15 +6278,15 @@
               </a:rPr>
               <a:t>Tomoaki-san</a:t>
             </a:r>
-            <a:endParaRPr lang="en-CA" b="1" dirty="0">
+            <a:endParaRPr lang="en-CA" b="1" i="0" dirty="0">
               <a:solidFill>
                 <a:srgbClr val="252525"/>
               </a:solidFill>
+              <a:effectLst/>
               <a:latin typeface="Arial" panose="020B0604020202020204" pitchFamily="34" charset="0"/>
             </a:endParaRPr>
           </a:p>
           <a:p>
-            <a:pPr marL="285750" indent="-285750"/>
             <a:r>
               <a:rPr lang="en-CA" dirty="0">
                 <a:latin typeface="Arial" panose="020B0604020202020204" pitchFamily="34" charset="0"/>
@@ -6315,7 +6297,7 @@
               <a:rPr lang="en-CA" b="1" dirty="0">
                 <a:latin typeface="Arial" panose="020B0604020202020204" pitchFamily="34" charset="0"/>
               </a:rPr>
-              <a:t>Latest about DID and VC </a:t>
+              <a:t>DID and VC </a:t>
             </a:r>
             <a:r>
               <a:rPr lang="en-CA" dirty="0">
@@ -6324,7 +6306,16 @@
                 </a:solidFill>
                 <a:latin typeface="Arial" panose="020B0604020202020204" pitchFamily="34" charset="0"/>
               </a:rPr>
-              <a:t>– Manu</a:t>
+              <a:t>– Manu </a:t>
+            </a:r>
+            <a:r>
+              <a:rPr lang="en-CA" dirty="0" err="1">
+                <a:solidFill>
+                  <a:srgbClr val="252525"/>
+                </a:solidFill>
+                <a:latin typeface="Arial" panose="020B0604020202020204" pitchFamily="34" charset="0"/>
+              </a:rPr>
+              <a:t>Sporny</a:t>
             </a:r>
             <a:br>
               <a:rPr lang="en-CA" dirty="0">
@@ -6367,6 +6358,7 @@
               <a:rPr lang="en-CA" i="0" dirty="0">
                 <a:effectLst/>
                 <a:latin typeface="Arial" panose="020B0604020202020204" pitchFamily="34" charset="0"/>
+                <a:cs typeface="Arial" panose="020B0604020202020204" pitchFamily="34" charset="0"/>
               </a:rPr>
               <a:t>15:00-16:00: </a:t>
             </a:r>
@@ -6374,13 +6366,33 @@
               <a:rPr lang="en-CA" i="0" dirty="0">
                 <a:effectLst/>
                 <a:latin typeface="Arial" panose="020B0604020202020204" pitchFamily="34" charset="0"/>
+                <a:cs typeface="Arial" panose="020B0604020202020204" pitchFamily="34" charset="0"/>
                 <a:hlinkClick r:id="rId2"/>
               </a:rPr>
-              <a:t>WoT demo sessions </a:t>
+              <a:t>WoT </a:t>
+            </a:r>
+            <a:r>
+              <a:rPr lang="en-CA" i="0" dirty="0">
+                <a:effectLst/>
+                <a:latin typeface="Arial" panose="020B0604020202020204" pitchFamily="34" charset="0"/>
+                <a:cs typeface="Arial" panose="020B0604020202020204" pitchFamily="34" charset="0"/>
+                <a:hlinkClick r:id="rId2"/>
+              </a:rPr>
+              <a:t>Web of Things (WoT) Status Update and Demos</a:t>
+            </a:r>
+            <a:r>
+              <a:rPr lang="en-CA" i="0" dirty="0">
+                <a:effectLst/>
+                <a:latin typeface="Arial" panose="020B0604020202020204" pitchFamily="34" charset="0"/>
+                <a:cs typeface="Arial" panose="020B0604020202020204" pitchFamily="34" charset="0"/>
+                <a:hlinkClick r:id="rId2"/>
+              </a:rPr>
+              <a:t> </a:t>
             </a:r>
             <a:endParaRPr lang="en-CA" i="0" dirty="0">
               <a:effectLst/>
               <a:latin typeface="Arial" panose="020B0604020202020204" pitchFamily="34" charset="0"/>
+              <a:cs typeface="Arial" panose="020B0604020202020204" pitchFamily="34" charset="0"/>
             </a:endParaRPr>
           </a:p>
           <a:p>
@@ -6390,7 +6402,8 @@
                   <a:srgbClr val="000000"/>
                 </a:solidFill>
                 <a:effectLst/>
-                <a:latin typeface="Calibri" panose="020F0502020204030204" pitchFamily="34" charset="0"/>
+                <a:latin typeface="Arial" panose="020B0604020202020204" pitchFamily="34" charset="0"/>
+                <a:cs typeface="Arial" panose="020B0604020202020204" pitchFamily="34" charset="0"/>
               </a:rPr>
               <a:t>16:30-17:30</a:t>
             </a:r>
@@ -6400,6 +6413,7 @@
                   <a:srgbClr val="000000"/>
                 </a:solidFill>
                 <a:latin typeface="Arial" panose="020B0604020202020204" pitchFamily="34" charset="0"/>
+                <a:cs typeface="Arial" panose="020B0604020202020204" pitchFamily="34" charset="0"/>
               </a:rPr>
               <a:t>: </a:t>
             </a:r>
@@ -6409,14 +6423,16 @@
                   <a:srgbClr val="000000"/>
                 </a:solidFill>
                 <a:effectLst/>
-                <a:latin typeface="Calibri" panose="020F0502020204030204" pitchFamily="34" charset="0"/>
+                <a:latin typeface="Arial" panose="020B0604020202020204" pitchFamily="34" charset="0"/>
+                <a:cs typeface="Arial" panose="020B0604020202020204" pitchFamily="34" charset="0"/>
                 <a:hlinkClick r:id="rId3"/>
               </a:rPr>
-              <a:t>Smart City</a:t>
+              <a:t>Web-based Digital Twins for Smart Cities</a:t>
             </a:r>
             <a:endParaRPr lang="en-CA" i="0" dirty="0">
               <a:effectLst/>
               <a:latin typeface="Arial" panose="020B0604020202020204" pitchFamily="34" charset="0"/>
+              <a:cs typeface="Arial" panose="020B0604020202020204" pitchFamily="34" charset="0"/>
             </a:endParaRPr>
           </a:p>
           <a:p>

</xml_diff>